<commit_message>
update sections of python modules
</commit_message>
<xml_diff>
--- a/3 Python Modules.pptx
+++ b/3 Python Modules.pptx
@@ -5,49 +5,48 @@
     <p:sldMasterId id="2147483658" r:id="rId1"/>
   </p:sldMasterIdLst>
   <p:notesMasterIdLst>
-    <p:notesMasterId r:id="rId10"/>
+    <p:notesMasterId r:id="rId9"/>
   </p:notesMasterIdLst>
   <p:handoutMasterIdLst>
-    <p:handoutMasterId r:id="rId11"/>
+    <p:handoutMasterId r:id="rId10"/>
   </p:handoutMasterIdLst>
   <p:sldIdLst>
     <p:sldId id="256" r:id="rId2"/>
-    <p:sldId id="281" r:id="rId3"/>
-    <p:sldId id="328" r:id="rId4"/>
-    <p:sldId id="329" r:id="rId5"/>
-    <p:sldId id="327" r:id="rId6"/>
-    <p:sldId id="325" r:id="rId7"/>
-    <p:sldId id="333" r:id="rId8"/>
-    <p:sldId id="280" r:id="rId9"/>
+    <p:sldId id="328" r:id="rId3"/>
+    <p:sldId id="329" r:id="rId4"/>
+    <p:sldId id="327" r:id="rId5"/>
+    <p:sldId id="325" r:id="rId6"/>
+    <p:sldId id="333" r:id="rId7"/>
+    <p:sldId id="280" r:id="rId8"/>
   </p:sldIdLst>
   <p:sldSz cx="9144000" cy="5143500" type="screen16x9"/>
   <p:notesSz cx="6858000" cy="9144000"/>
   <p:embeddedFontLst>
     <p:embeddedFont>
       <p:font typeface="Consolas" panose="020B0609020204030204" pitchFamily="49" charset="0"/>
-      <p:regular r:id="rId12"/>
-      <p:bold r:id="rId13"/>
-      <p:italic r:id="rId14"/>
-      <p:boldItalic r:id="rId15"/>
+      <p:regular r:id="rId11"/>
+      <p:bold r:id="rId12"/>
+      <p:italic r:id="rId13"/>
+      <p:boldItalic r:id="rId14"/>
     </p:embeddedFont>
     <p:embeddedFont>
       <p:font typeface="Roboto Slab" panose="020B0604020202020204" charset="0"/>
-      <p:regular r:id="rId16"/>
-      <p:bold r:id="rId17"/>
+      <p:regular r:id="rId15"/>
+      <p:bold r:id="rId16"/>
     </p:embeddedFont>
     <p:embeddedFont>
       <p:font typeface="Source Sans Pro" panose="020B0503030403020204" pitchFamily="34" charset="0"/>
-      <p:regular r:id="rId18"/>
-      <p:bold r:id="rId19"/>
-      <p:italic r:id="rId20"/>
-      <p:boldItalic r:id="rId21"/>
+      <p:regular r:id="rId17"/>
+      <p:bold r:id="rId18"/>
+      <p:italic r:id="rId19"/>
+      <p:boldItalic r:id="rId20"/>
     </p:embeddedFont>
     <p:embeddedFont>
       <p:font typeface="Trebuchet MS" panose="020B0603020202020204" pitchFamily="34" charset="0"/>
-      <p:regular r:id="rId22"/>
-      <p:bold r:id="rId23"/>
-      <p:italic r:id="rId24"/>
-      <p:boldItalic r:id="rId25"/>
+      <p:regular r:id="rId21"/>
+      <p:bold r:id="rId22"/>
+      <p:italic r:id="rId23"/>
+      <p:boldItalic r:id="rId24"/>
     </p:embeddedFont>
   </p:embeddedFontLst>
   <p:defaultTextStyle>
@@ -5153,115 +5152,6 @@
   <p:cSld>
     <p:spTree>
       <p:nvGrpSpPr>
-        <p:cNvPr id="1" name="Shape 93"/>
-        <p:cNvGrpSpPr/>
-        <p:nvPr/>
-      </p:nvGrpSpPr>
-      <p:grpSpPr>
-        <a:xfrm>
-          <a:off x="0" y="0"/>
-          <a:ext cx="0" cy="0"/>
-          <a:chOff x="0" y="0"/>
-          <a:chExt cx="0" cy="0"/>
-        </a:xfrm>
-      </p:grpSpPr>
-      <p:sp>
-        <p:nvSpPr>
-          <p:cNvPr id="94" name="Google Shape;94;g35f391192_029:notes"/>
-          <p:cNvSpPr>
-            <a:spLocks noGrp="1" noRot="1" noChangeAspect="1"/>
-          </p:cNvSpPr>
-          <p:nvPr>
-            <p:ph type="sldImg" idx="2"/>
-          </p:nvPr>
-        </p:nvSpPr>
-        <p:spPr>
-          <a:xfrm>
-            <a:off x="381000" y="685800"/>
-            <a:ext cx="6096000" cy="3429000"/>
-          </a:xfrm>
-          <a:custGeom>
-            <a:avLst/>
-            <a:gdLst/>
-            <a:ahLst/>
-            <a:cxnLst/>
-            <a:rect l="l" t="t" r="r" b="b"/>
-            <a:pathLst>
-              <a:path w="120000" h="120000" extrusionOk="0">
-                <a:moveTo>
-                  <a:pt x="0" y="0"/>
-                </a:moveTo>
-                <a:lnTo>
-                  <a:pt x="120000" y="0"/>
-                </a:lnTo>
-                <a:lnTo>
-                  <a:pt x="120000" y="120000"/>
-                </a:lnTo>
-                <a:lnTo>
-                  <a:pt x="0" y="120000"/>
-                </a:lnTo>
-                <a:close/>
-              </a:path>
-            </a:pathLst>
-          </a:custGeom>
-        </p:spPr>
-      </p:sp>
-      <p:sp>
-        <p:nvSpPr>
-          <p:cNvPr id="95" name="Google Shape;95;g35f391192_029:notes"/>
-          <p:cNvSpPr txBox="1">
-            <a:spLocks noGrp="1"/>
-          </p:cNvSpPr>
-          <p:nvPr>
-            <p:ph type="body" idx="1"/>
-          </p:nvPr>
-        </p:nvSpPr>
-        <p:spPr>
-          <a:xfrm>
-            <a:off x="685800" y="4343400"/>
-            <a:ext cx="5486400" cy="4114800"/>
-          </a:xfrm>
-          <a:prstGeom prst="rect">
-            <a:avLst/>
-          </a:prstGeom>
-        </p:spPr>
-        <p:txBody>
-          <a:bodyPr spcFirstLastPara="1" wrap="square" lIns="91425" tIns="91425" rIns="91425" bIns="91425" anchor="t" anchorCtr="0">
-            <a:noAutofit/>
-          </a:bodyPr>
-          <a:lstStyle/>
-          <a:p>
-            <a:pPr marL="0" lvl="0" indent="0" algn="l" rtl="0">
-              <a:spcBef>
-                <a:spcPts val="0"/>
-              </a:spcBef>
-              <a:spcAft>
-                <a:spcPts val="0"/>
-              </a:spcAft>
-              <a:buNone/>
-            </a:pPr>
-            <a:endParaRPr/>
-          </a:p>
-        </p:txBody>
-      </p:sp>
-    </p:spTree>
-    <p:extLst>
-      <p:ext uri="{BB962C8B-B14F-4D97-AF65-F5344CB8AC3E}">
-        <p14:creationId xmlns:p14="http://schemas.microsoft.com/office/powerpoint/2010/main" val="3429919189"/>
-      </p:ext>
-    </p:extLst>
-  </p:cSld>
-  <p:clrMapOvr>
-    <a:masterClrMapping/>
-  </p:clrMapOvr>
-</p:notes>
-</file>
-
-<file path=ppt/notesSlides/notesSlide3.xml><?xml version="1.0" encoding="utf-8"?>
-<p:notes xmlns:a="http://schemas.openxmlformats.org/drawingml/2006/main" xmlns:r="http://schemas.openxmlformats.org/officeDocument/2006/relationships" xmlns:p="http://schemas.openxmlformats.org/presentationml/2006/main" showMasterSp="0" showMasterPhAnim="0">
-  <p:cSld>
-    <p:spTree>
-      <p:nvGrpSpPr>
         <p:cNvPr id="1" name="Shape 399"/>
         <p:cNvGrpSpPr/>
         <p:nvPr/>
@@ -6211,368 +6101,6 @@
 </file>
 
 <file path=ppt/slideLayouts/slideLayout2.xml><?xml version="1.0" encoding="utf-8"?>
-<p:sldLayout xmlns:a="http://schemas.openxmlformats.org/drawingml/2006/main" xmlns:r="http://schemas.openxmlformats.org/officeDocument/2006/relationships" xmlns:p="http://schemas.openxmlformats.org/presentationml/2006/main" matchingName="Subtitle">
-  <p:cSld name="TITLE_1">
-    <p:bg>
-      <p:bgPr>
-        <a:blipFill>
-          <a:blip r:embed="rId2">
-            <a:alphaModFix/>
-          </a:blip>
-          <a:stretch>
-            <a:fillRect/>
-          </a:stretch>
-        </a:blipFill>
-        <a:effectLst/>
-      </p:bgPr>
-    </p:bg>
-    <p:spTree>
-      <p:nvGrpSpPr>
-        <p:cNvPr id="1" name="Shape 26"/>
-        <p:cNvGrpSpPr/>
-        <p:nvPr/>
-      </p:nvGrpSpPr>
-      <p:grpSpPr>
-        <a:xfrm>
-          <a:off x="0" y="0"/>
-          <a:ext cx="0" cy="0"/>
-          <a:chOff x="0" y="0"/>
-          <a:chExt cx="0" cy="0"/>
-        </a:xfrm>
-      </p:grpSpPr>
-      <p:sp>
-        <p:nvSpPr>
-          <p:cNvPr id="27" name="Google Shape;27;p3"/>
-          <p:cNvSpPr txBox="1">
-            <a:spLocks noGrp="1"/>
-          </p:cNvSpPr>
-          <p:nvPr>
-            <p:ph type="ctrTitle"/>
-          </p:nvPr>
-        </p:nvSpPr>
-        <p:spPr>
-          <a:xfrm>
-            <a:off x="1546025" y="1754794"/>
-            <a:ext cx="5832600" cy="1159800"/>
-          </a:xfrm>
-          <a:prstGeom prst="rect">
-            <a:avLst/>
-          </a:prstGeom>
-        </p:spPr>
-        <p:txBody>
-          <a:bodyPr spcFirstLastPara="1" wrap="square" lIns="91425" tIns="91425" rIns="91425" bIns="91425" anchor="b" anchorCtr="0">
-            <a:noAutofit/>
-          </a:bodyPr>
-          <a:lstStyle>
-            <a:lvl1pPr lvl="0" algn="ctr" rtl="0">
-              <a:spcBef>
-                <a:spcPts val="0"/>
-              </a:spcBef>
-              <a:spcAft>
-                <a:spcPts val="0"/>
-              </a:spcAft>
-              <a:buSzPts val="4400"/>
-              <a:buNone/>
-              <a:defRPr sz="4400" b="1">
-                <a:latin typeface="Trebuchet MS" panose="020B0603020202020204" pitchFamily="34" charset="0"/>
-              </a:defRPr>
-            </a:lvl1pPr>
-            <a:lvl2pPr lvl="1" rtl="0">
-              <a:spcBef>
-                <a:spcPts val="0"/>
-              </a:spcBef>
-              <a:spcAft>
-                <a:spcPts val="0"/>
-              </a:spcAft>
-              <a:buSzPts val="4400"/>
-              <a:buNone/>
-              <a:defRPr sz="4400" b="1"/>
-            </a:lvl2pPr>
-            <a:lvl3pPr lvl="2" rtl="0">
-              <a:spcBef>
-                <a:spcPts val="0"/>
-              </a:spcBef>
-              <a:spcAft>
-                <a:spcPts val="0"/>
-              </a:spcAft>
-              <a:buSzPts val="4400"/>
-              <a:buNone/>
-              <a:defRPr sz="4400" b="1"/>
-            </a:lvl3pPr>
-            <a:lvl4pPr lvl="3" rtl="0">
-              <a:spcBef>
-                <a:spcPts val="0"/>
-              </a:spcBef>
-              <a:spcAft>
-                <a:spcPts val="0"/>
-              </a:spcAft>
-              <a:buSzPts val="4400"/>
-              <a:buNone/>
-              <a:defRPr sz="4400" b="1"/>
-            </a:lvl4pPr>
-            <a:lvl5pPr lvl="4" rtl="0">
-              <a:spcBef>
-                <a:spcPts val="0"/>
-              </a:spcBef>
-              <a:spcAft>
-                <a:spcPts val="0"/>
-              </a:spcAft>
-              <a:buSzPts val="4400"/>
-              <a:buNone/>
-              <a:defRPr sz="4400" b="1"/>
-            </a:lvl5pPr>
-            <a:lvl6pPr lvl="5" rtl="0">
-              <a:spcBef>
-                <a:spcPts val="0"/>
-              </a:spcBef>
-              <a:spcAft>
-                <a:spcPts val="0"/>
-              </a:spcAft>
-              <a:buSzPts val="4400"/>
-              <a:buNone/>
-              <a:defRPr sz="4400" b="1"/>
-            </a:lvl6pPr>
-            <a:lvl7pPr lvl="6" rtl="0">
-              <a:spcBef>
-                <a:spcPts val="0"/>
-              </a:spcBef>
-              <a:spcAft>
-                <a:spcPts val="0"/>
-              </a:spcAft>
-              <a:buSzPts val="4400"/>
-              <a:buNone/>
-              <a:defRPr sz="4400" b="1"/>
-            </a:lvl7pPr>
-            <a:lvl8pPr lvl="7" rtl="0">
-              <a:spcBef>
-                <a:spcPts val="0"/>
-              </a:spcBef>
-              <a:spcAft>
-                <a:spcPts val="0"/>
-              </a:spcAft>
-              <a:buSzPts val="4400"/>
-              <a:buNone/>
-              <a:defRPr sz="4400" b="1"/>
-            </a:lvl8pPr>
-            <a:lvl9pPr lvl="8" rtl="0">
-              <a:spcBef>
-                <a:spcPts val="0"/>
-              </a:spcBef>
-              <a:spcAft>
-                <a:spcPts val="0"/>
-              </a:spcAft>
-              <a:buSzPts val="4400"/>
-              <a:buNone/>
-              <a:defRPr sz="4400" b="1"/>
-            </a:lvl9pPr>
-          </a:lstStyle>
-          <a:p>
-            <a:endParaRPr dirty="0"/>
-          </a:p>
-        </p:txBody>
-      </p:sp>
-      <p:sp>
-        <p:nvSpPr>
-          <p:cNvPr id="28" name="Google Shape;28;p3"/>
-          <p:cNvSpPr txBox="1">
-            <a:spLocks noGrp="1"/>
-          </p:cNvSpPr>
-          <p:nvPr>
-            <p:ph type="subTitle" idx="1"/>
-          </p:nvPr>
-        </p:nvSpPr>
-        <p:spPr>
-          <a:xfrm>
-            <a:off x="1546025" y="3011511"/>
-            <a:ext cx="5832600" cy="784800"/>
-          </a:xfrm>
-          <a:prstGeom prst="rect">
-            <a:avLst/>
-          </a:prstGeom>
-        </p:spPr>
-        <p:txBody>
-          <a:bodyPr spcFirstLastPara="1" wrap="square" lIns="91425" tIns="91425" rIns="91425" bIns="91425" anchor="t" anchorCtr="0">
-            <a:noAutofit/>
-          </a:bodyPr>
-          <a:lstStyle>
-            <a:lvl1pPr lvl="0" algn="ctr" rtl="0">
-              <a:spcBef>
-                <a:spcPts val="0"/>
-              </a:spcBef>
-              <a:spcAft>
-                <a:spcPts val="0"/>
-              </a:spcAft>
-              <a:buClr>
-                <a:schemeClr val="accent3"/>
-              </a:buClr>
-              <a:buSzPts val="3000"/>
-              <a:buNone/>
-              <a:defRPr>
-                <a:solidFill>
-                  <a:schemeClr val="accent3"/>
-                </a:solidFill>
-                <a:latin typeface="Trebuchet MS" panose="020B0603020202020204" pitchFamily="34" charset="0"/>
-              </a:defRPr>
-            </a:lvl1pPr>
-            <a:lvl2pPr lvl="1" rtl="0">
-              <a:spcBef>
-                <a:spcPts val="0"/>
-              </a:spcBef>
-              <a:spcAft>
-                <a:spcPts val="0"/>
-              </a:spcAft>
-              <a:buClr>
-                <a:schemeClr val="accent3"/>
-              </a:buClr>
-              <a:buSzPts val="3000"/>
-              <a:buNone/>
-              <a:defRPr sz="3000">
-                <a:solidFill>
-                  <a:schemeClr val="accent3"/>
-                </a:solidFill>
-              </a:defRPr>
-            </a:lvl2pPr>
-            <a:lvl3pPr lvl="2" rtl="0">
-              <a:spcBef>
-                <a:spcPts val="0"/>
-              </a:spcBef>
-              <a:spcAft>
-                <a:spcPts val="0"/>
-              </a:spcAft>
-              <a:buClr>
-                <a:schemeClr val="accent3"/>
-              </a:buClr>
-              <a:buSzPts val="3000"/>
-              <a:buNone/>
-              <a:defRPr sz="3000">
-                <a:solidFill>
-                  <a:schemeClr val="accent3"/>
-                </a:solidFill>
-              </a:defRPr>
-            </a:lvl3pPr>
-            <a:lvl4pPr lvl="3" rtl="0">
-              <a:spcBef>
-                <a:spcPts val="0"/>
-              </a:spcBef>
-              <a:spcAft>
-                <a:spcPts val="0"/>
-              </a:spcAft>
-              <a:buClr>
-                <a:schemeClr val="accent3"/>
-              </a:buClr>
-              <a:buSzPts val="3000"/>
-              <a:buNone/>
-              <a:defRPr sz="3000">
-                <a:solidFill>
-                  <a:schemeClr val="accent3"/>
-                </a:solidFill>
-              </a:defRPr>
-            </a:lvl4pPr>
-            <a:lvl5pPr lvl="4" rtl="0">
-              <a:spcBef>
-                <a:spcPts val="0"/>
-              </a:spcBef>
-              <a:spcAft>
-                <a:spcPts val="0"/>
-              </a:spcAft>
-              <a:buClr>
-                <a:schemeClr val="accent3"/>
-              </a:buClr>
-              <a:buSzPts val="3000"/>
-              <a:buNone/>
-              <a:defRPr sz="3000">
-                <a:solidFill>
-                  <a:schemeClr val="accent3"/>
-                </a:solidFill>
-              </a:defRPr>
-            </a:lvl5pPr>
-            <a:lvl6pPr lvl="5" rtl="0">
-              <a:spcBef>
-                <a:spcPts val="0"/>
-              </a:spcBef>
-              <a:spcAft>
-                <a:spcPts val="0"/>
-              </a:spcAft>
-              <a:buClr>
-                <a:schemeClr val="accent3"/>
-              </a:buClr>
-              <a:buSzPts val="3000"/>
-              <a:buNone/>
-              <a:defRPr sz="3000">
-                <a:solidFill>
-                  <a:schemeClr val="accent3"/>
-                </a:solidFill>
-              </a:defRPr>
-            </a:lvl6pPr>
-            <a:lvl7pPr lvl="6" rtl="0">
-              <a:spcBef>
-                <a:spcPts val="0"/>
-              </a:spcBef>
-              <a:spcAft>
-                <a:spcPts val="0"/>
-              </a:spcAft>
-              <a:buClr>
-                <a:schemeClr val="accent3"/>
-              </a:buClr>
-              <a:buSzPts val="3000"/>
-              <a:buNone/>
-              <a:defRPr sz="3000">
-                <a:solidFill>
-                  <a:schemeClr val="accent3"/>
-                </a:solidFill>
-              </a:defRPr>
-            </a:lvl7pPr>
-            <a:lvl8pPr lvl="7" rtl="0">
-              <a:spcBef>
-                <a:spcPts val="0"/>
-              </a:spcBef>
-              <a:spcAft>
-                <a:spcPts val="0"/>
-              </a:spcAft>
-              <a:buClr>
-                <a:schemeClr val="accent3"/>
-              </a:buClr>
-              <a:buSzPts val="3000"/>
-              <a:buNone/>
-              <a:defRPr sz="3000">
-                <a:solidFill>
-                  <a:schemeClr val="accent3"/>
-                </a:solidFill>
-              </a:defRPr>
-            </a:lvl8pPr>
-            <a:lvl9pPr lvl="8" rtl="0">
-              <a:spcBef>
-                <a:spcPts val="0"/>
-              </a:spcBef>
-              <a:spcAft>
-                <a:spcPts val="0"/>
-              </a:spcAft>
-              <a:buClr>
-                <a:schemeClr val="accent3"/>
-              </a:buClr>
-              <a:buSzPts val="3000"/>
-              <a:buNone/>
-              <a:defRPr sz="3000">
-                <a:solidFill>
-                  <a:schemeClr val="accent3"/>
-                </a:solidFill>
-              </a:defRPr>
-            </a:lvl9pPr>
-          </a:lstStyle>
-          <a:p>
-            <a:endParaRPr/>
-          </a:p>
-        </p:txBody>
-      </p:sp>
-    </p:spTree>
-  </p:cSld>
-  <p:clrMapOvr>
-    <a:masterClrMapping/>
-  </p:clrMapOvr>
-</p:sldLayout>
-</file>
-
-<file path=ppt/slideLayouts/slideLayout3.xml><?xml version="1.0" encoding="utf-8"?>
 <p:sldLayout xmlns:a="http://schemas.openxmlformats.org/drawingml/2006/main" xmlns:r="http://schemas.openxmlformats.org/officeDocument/2006/relationships" xmlns:p="http://schemas.openxmlformats.org/presentationml/2006/main" matchingName="Title + 1 column" type="tx">
   <p:cSld name="TITLE_AND_BODY">
     <p:spTree>
@@ -6938,7 +6466,7 @@
 </p:sldLayout>
 </file>
 
-<file path=ppt/slideLayouts/slideLayout4.xml><?xml version="1.0" encoding="utf-8"?>
+<file path=ppt/slideLayouts/slideLayout3.xml><?xml version="1.0" encoding="utf-8"?>
 <p:sldLayout xmlns:a="http://schemas.openxmlformats.org/drawingml/2006/main" xmlns:r="http://schemas.openxmlformats.org/officeDocument/2006/relationships" xmlns:p="http://schemas.openxmlformats.org/presentationml/2006/main" matchingName="Blank" type="blank">
   <p:cSld name="BLANK">
     <p:bg>
@@ -7061,7 +6589,7 @@
     <p:bg>
       <p:bgPr>
         <a:blipFill>
-          <a:blip r:embed="rId6">
+          <a:blip r:embed="rId5">
             <a:alphaModFix/>
           </a:blip>
           <a:stretch>
@@ -7732,9 +7260,8 @@
   <p:clrMap bg1="lt1" tx1="dk1" bg2="dk2" tx2="lt2" accent1="accent1" accent2="accent2" accent3="accent3" accent4="accent4" accent5="accent5" accent6="accent6" hlink="hlink" folHlink="folHlink"/>
   <p:sldLayoutIdLst>
     <p:sldLayoutId id="2147483648" r:id="rId1"/>
-    <p:sldLayoutId id="2147483649" r:id="rId2"/>
-    <p:sldLayoutId id="2147483651" r:id="rId3"/>
-    <p:sldLayoutId id="2147483656" r:id="rId4"/>
+    <p:sldLayoutId id="2147483651" r:id="rId2"/>
+    <p:sldLayoutId id="2147483656" r:id="rId3"/>
   </p:sldLayoutIdLst>
   <p:transition>
     <p:fade thruBlk="1"/>
@@ -8550,135 +8077,6 @@
   <p:cSld>
     <p:spTree>
       <p:nvGrpSpPr>
-        <p:cNvPr id="1" name="Shape 96"/>
-        <p:cNvGrpSpPr/>
-        <p:nvPr/>
-      </p:nvGrpSpPr>
-      <p:grpSpPr>
-        <a:xfrm>
-          <a:off x="0" y="0"/>
-          <a:ext cx="0" cy="0"/>
-          <a:chOff x="0" y="0"/>
-          <a:chExt cx="0" cy="0"/>
-        </a:xfrm>
-      </p:grpSpPr>
-      <p:sp>
-        <p:nvSpPr>
-          <p:cNvPr id="97" name="Google Shape;97;p15"/>
-          <p:cNvSpPr txBox="1">
-            <a:spLocks noGrp="1"/>
-          </p:cNvSpPr>
-          <p:nvPr>
-            <p:ph type="ctrTitle"/>
-          </p:nvPr>
-        </p:nvSpPr>
-        <p:spPr>
-          <a:xfrm>
-            <a:off x="1655700" y="1991850"/>
-            <a:ext cx="5832600" cy="1159800"/>
-          </a:xfrm>
-          <a:prstGeom prst="rect">
-            <a:avLst/>
-          </a:prstGeom>
-        </p:spPr>
-        <p:txBody>
-          <a:bodyPr spcFirstLastPara="1" wrap="square" lIns="91425" tIns="91425" rIns="91425" bIns="91425" anchor="ctr" anchorCtr="0">
-            <a:noAutofit/>
-          </a:bodyPr>
-          <a:lstStyle/>
-          <a:p>
-            <a:pPr marL="0" lvl="0" indent="0" algn="ctr" rtl="0">
-              <a:spcBef>
-                <a:spcPts val="0"/>
-              </a:spcBef>
-              <a:spcAft>
-                <a:spcPts val="0"/>
-              </a:spcAft>
-              <a:buNone/>
-            </a:pPr>
-            <a:r>
-              <a:rPr lang="en-US" sz="6000">
-                <a:solidFill>
-                  <a:srgbClr val="E6E6E6"/>
-                </a:solidFill>
-              </a:rPr>
-              <a:t>1</a:t>
-            </a:r>
-            <a:endParaRPr sz="6000">
-              <a:solidFill>
-                <a:srgbClr val="E6E6E6"/>
-              </a:solidFill>
-            </a:endParaRPr>
-          </a:p>
-          <a:p>
-            <a:r>
-              <a:rPr lang="en-US" b="1"/>
-              <a:t>Python Modules</a:t>
-            </a:r>
-            <a:endParaRPr/>
-          </a:p>
-        </p:txBody>
-      </p:sp>
-      <p:sp>
-        <p:nvSpPr>
-          <p:cNvPr id="99" name="Google Shape;99;p15"/>
-          <p:cNvSpPr txBox="1">
-            <a:spLocks noGrp="1"/>
-          </p:cNvSpPr>
-          <p:nvPr>
-            <p:ph type="sldNum" idx="4294967295"/>
-          </p:nvPr>
-        </p:nvSpPr>
-        <p:spPr>
-          <a:xfrm>
-            <a:off x="8404384" y="4749851"/>
-            <a:ext cx="548700" cy="393600"/>
-          </a:xfrm>
-          <a:prstGeom prst="rect">
-            <a:avLst/>
-          </a:prstGeom>
-        </p:spPr>
-        <p:txBody>
-          <a:bodyPr spcFirstLastPara="1" wrap="square" lIns="91425" tIns="91425" rIns="91425" bIns="91425" anchor="t" anchorCtr="0">
-            <a:noAutofit/>
-          </a:bodyPr>
-          <a:lstStyle/>
-          <a:p>
-            <a:pPr marL="0" lvl="0" indent="0" algn="r" rtl="0">
-              <a:spcBef>
-                <a:spcPts val="0"/>
-              </a:spcBef>
-              <a:spcAft>
-                <a:spcPts val="0"/>
-              </a:spcAft>
-              <a:buNone/>
-            </a:pPr>
-            <a:fld id="{00000000-1234-1234-1234-123412341234}" type="slidenum">
-              <a:rPr lang="en"/>
-              <a:t>2</a:t>
-            </a:fld>
-            <a:endParaRPr/>
-          </a:p>
-        </p:txBody>
-      </p:sp>
-    </p:spTree>
-    <p:extLst>
-      <p:ext uri="{BB962C8B-B14F-4D97-AF65-F5344CB8AC3E}">
-        <p14:creationId xmlns:p14="http://schemas.microsoft.com/office/powerpoint/2010/main" val="1620004517"/>
-      </p:ext>
-    </p:extLst>
-  </p:cSld>
-  <p:clrMapOvr>
-    <a:masterClrMapping/>
-  </p:clrMapOvr>
-</p:sld>
-</file>
-
-<file path=ppt/slides/slide3.xml><?xml version="1.0" encoding="utf-8"?>
-<p:sld xmlns:a="http://schemas.openxmlformats.org/drawingml/2006/main" xmlns:r="http://schemas.openxmlformats.org/officeDocument/2006/relationships" xmlns:p="http://schemas.openxmlformats.org/presentationml/2006/main">
-  <p:cSld>
-    <p:spTree>
-      <p:nvGrpSpPr>
         <p:cNvPr id="1" name=""/>
         <p:cNvGrpSpPr/>
         <p:nvPr/>
@@ -9029,7 +8427,7 @@
             </a:pPr>
             <a:fld id="{00000000-1234-1234-1234-123412341234}" type="slidenum">
               <a:rPr lang="en" smtClean="0"/>
-              <a:t>3</a:t>
+              <a:t>2</a:t>
             </a:fld>
             <a:endParaRPr lang="en"/>
           </a:p>
@@ -9048,7 +8446,7 @@
 </p:sld>
 </file>
 
-<file path=ppt/slides/slide4.xml><?xml version="1.0" encoding="utf-8"?>
+<file path=ppt/slides/slide3.xml><?xml version="1.0" encoding="utf-8"?>
 <p:sld xmlns:a="http://schemas.openxmlformats.org/drawingml/2006/main" xmlns:r="http://schemas.openxmlformats.org/officeDocument/2006/relationships" xmlns:p="http://schemas.openxmlformats.org/presentationml/2006/main">
   <p:cSld>
     <p:spTree>
@@ -9338,7 +8736,7 @@
             </a:pPr>
             <a:fld id="{00000000-1234-1234-1234-123412341234}" type="slidenum">
               <a:rPr lang="en" smtClean="0"/>
-              <a:t>4</a:t>
+              <a:t>3</a:t>
             </a:fld>
             <a:endParaRPr lang="en"/>
           </a:p>
@@ -9357,7 +8755,7 @@
 </p:sld>
 </file>
 
-<file path=ppt/slides/slide5.xml><?xml version="1.0" encoding="utf-8"?>
+<file path=ppt/slides/slide4.xml><?xml version="1.0" encoding="utf-8"?>
 <p:sld xmlns:a="http://schemas.openxmlformats.org/drawingml/2006/main" xmlns:r="http://schemas.openxmlformats.org/officeDocument/2006/relationships" xmlns:p="http://schemas.openxmlformats.org/presentationml/2006/main">
   <p:cSld>
     <p:spTree>
@@ -9640,7 +9038,7 @@
             </a:pPr>
             <a:fld id="{00000000-1234-1234-1234-123412341234}" type="slidenum">
               <a:rPr lang="en" smtClean="0"/>
-              <a:t>5</a:t>
+              <a:t>4</a:t>
             </a:fld>
             <a:endParaRPr lang="en"/>
           </a:p>
@@ -9659,7 +9057,7 @@
 </p:sld>
 </file>
 
-<file path=ppt/slides/slide6.xml><?xml version="1.0" encoding="utf-8"?>
+<file path=ppt/slides/slide5.xml><?xml version="1.0" encoding="utf-8"?>
 <p:sld xmlns:a="http://schemas.openxmlformats.org/drawingml/2006/main" xmlns:r="http://schemas.openxmlformats.org/officeDocument/2006/relationships" xmlns:p="http://schemas.openxmlformats.org/presentationml/2006/main">
   <p:cSld>
     <p:spTree>
@@ -9843,7 +9241,7 @@
             </a:pPr>
             <a:fld id="{00000000-1234-1234-1234-123412341234}" type="slidenum">
               <a:rPr lang="en" smtClean="0"/>
-              <a:t>6</a:t>
+              <a:t>5</a:t>
             </a:fld>
             <a:endParaRPr lang="en"/>
           </a:p>
@@ -9890,7 +9288,7 @@
 </p:sld>
 </file>
 
-<file path=ppt/slides/slide7.xml><?xml version="1.0" encoding="utf-8"?>
+<file path=ppt/slides/slide6.xml><?xml version="1.0" encoding="utf-8"?>
 <p:sld xmlns:a="http://schemas.openxmlformats.org/drawingml/2006/main" xmlns:r="http://schemas.openxmlformats.org/officeDocument/2006/relationships" xmlns:p="http://schemas.openxmlformats.org/presentationml/2006/main">
   <p:cSld>
     <p:spTree>
@@ -10157,7 +9555,7 @@
             </a:pPr>
             <a:fld id="{00000000-1234-1234-1234-123412341234}" type="slidenum">
               <a:rPr lang="en" smtClean="0"/>
-              <a:t>7</a:t>
+              <a:t>6</a:t>
             </a:fld>
             <a:endParaRPr lang="en"/>
           </a:p>
@@ -10176,7 +9574,7 @@
 </p:sld>
 </file>
 
-<file path=ppt/slides/slide8.xml><?xml version="1.0" encoding="utf-8"?>
+<file path=ppt/slides/slide7.xml><?xml version="1.0" encoding="utf-8"?>
 <p:sld xmlns:a="http://schemas.openxmlformats.org/drawingml/2006/main" xmlns:r="http://schemas.openxmlformats.org/officeDocument/2006/relationships" xmlns:p="http://schemas.openxmlformats.org/presentationml/2006/main">
   <p:cSld>
     <p:spTree>
@@ -10429,7 +9827,7 @@
             </a:pPr>
             <a:fld id="{00000000-1234-1234-1234-123412341234}" type="slidenum">
               <a:rPr lang="en"/>
-              <a:t>8</a:t>
+              <a:t>7</a:t>
             </a:fld>
             <a:endParaRPr/>
           </a:p>

</xml_diff>